<commit_message>
Update a whole flow of the code.
</commit_message>
<xml_diff>
--- a/doc_ideas/202305_flowchart.pptx
+++ b/doc_ideas/202305_flowchart.pptx
@@ -268,7 +268,7 @@
           <a:p>
             <a:fld id="{F467A90D-6061-43A1-9F48-580B251C3410}" type="datetimeFigureOut">
               <a:rPr lang="en-GB" smtClean="0"/>
-              <a:t>11/07/2023</a:t>
+              <a:t>17/07/2023</a:t>
             </a:fld>
             <a:endParaRPr lang="en-GB"/>
           </a:p>
@@ -500,7 +500,7 @@
           <a:p>
             <a:fld id="{F467A90D-6061-43A1-9F48-580B251C3410}" type="datetimeFigureOut">
               <a:rPr lang="en-GB" smtClean="0"/>
-              <a:t>11/07/2023</a:t>
+              <a:t>17/07/2023</a:t>
             </a:fld>
             <a:endParaRPr lang="en-GB"/>
           </a:p>
@@ -742,7 +742,7 @@
           <a:p>
             <a:fld id="{F467A90D-6061-43A1-9F48-580B251C3410}" type="datetimeFigureOut">
               <a:rPr lang="en-GB" smtClean="0"/>
-              <a:t>11/07/2023</a:t>
+              <a:t>17/07/2023</a:t>
             </a:fld>
             <a:endParaRPr lang="en-GB"/>
           </a:p>
@@ -974,7 +974,7 @@
           <a:p>
             <a:fld id="{F467A90D-6061-43A1-9F48-580B251C3410}" type="datetimeFigureOut">
               <a:rPr lang="en-GB" smtClean="0"/>
-              <a:t>11/07/2023</a:t>
+              <a:t>17/07/2023</a:t>
             </a:fld>
             <a:endParaRPr lang="en-GB"/>
           </a:p>
@@ -1250,7 +1250,7 @@
           <a:p>
             <a:fld id="{F467A90D-6061-43A1-9F48-580B251C3410}" type="datetimeFigureOut">
               <a:rPr lang="en-GB" smtClean="0"/>
-              <a:t>11/07/2023</a:t>
+              <a:t>17/07/2023</a:t>
             </a:fld>
             <a:endParaRPr lang="en-GB"/>
           </a:p>
@@ -1582,7 +1582,7 @@
           <a:p>
             <a:fld id="{F467A90D-6061-43A1-9F48-580B251C3410}" type="datetimeFigureOut">
               <a:rPr lang="en-GB" smtClean="0"/>
-              <a:t>11/07/2023</a:t>
+              <a:t>17/07/2023</a:t>
             </a:fld>
             <a:endParaRPr lang="en-GB"/>
           </a:p>
@@ -2061,7 +2061,7 @@
           <a:p>
             <a:fld id="{F467A90D-6061-43A1-9F48-580B251C3410}" type="datetimeFigureOut">
               <a:rPr lang="en-GB" smtClean="0"/>
-              <a:t>11/07/2023</a:t>
+              <a:t>17/07/2023</a:t>
             </a:fld>
             <a:endParaRPr lang="en-GB"/>
           </a:p>
@@ -2203,7 +2203,7 @@
           <a:p>
             <a:fld id="{F467A90D-6061-43A1-9F48-580B251C3410}" type="datetimeFigureOut">
               <a:rPr lang="en-GB" smtClean="0"/>
-              <a:t>11/07/2023</a:t>
+              <a:t>17/07/2023</a:t>
             </a:fld>
             <a:endParaRPr lang="en-GB"/>
           </a:p>
@@ -2316,7 +2316,7 @@
           <a:p>
             <a:fld id="{F467A90D-6061-43A1-9F48-580B251C3410}" type="datetimeFigureOut">
               <a:rPr lang="en-GB" smtClean="0"/>
-              <a:t>11/07/2023</a:t>
+              <a:t>17/07/2023</a:t>
             </a:fld>
             <a:endParaRPr lang="en-GB"/>
           </a:p>
@@ -2661,7 +2661,7 @@
           <a:p>
             <a:fld id="{F467A90D-6061-43A1-9F48-580B251C3410}" type="datetimeFigureOut">
               <a:rPr lang="en-GB" smtClean="0"/>
-              <a:t>11/07/2023</a:t>
+              <a:t>17/07/2023</a:t>
             </a:fld>
             <a:endParaRPr lang="en-GB"/>
           </a:p>
@@ -2950,7 +2950,7 @@
           <a:p>
             <a:fld id="{F467A90D-6061-43A1-9F48-580B251C3410}" type="datetimeFigureOut">
               <a:rPr lang="en-GB" smtClean="0"/>
-              <a:t>11/07/2023</a:t>
+              <a:t>17/07/2023</a:t>
             </a:fld>
             <a:endParaRPr lang="en-GB"/>
           </a:p>
@@ -3225,7 +3225,7 @@
           <a:p>
             <a:fld id="{F467A90D-6061-43A1-9F48-580B251C3410}" type="datetimeFigureOut">
               <a:rPr lang="en-GB" smtClean="0"/>
-              <a:t>11/07/2023</a:t>
+              <a:t>17/07/2023</a:t>
             </a:fld>
             <a:endParaRPr lang="en-GB"/>
           </a:p>
@@ -3642,58 +3642,6 @@
           <a:chExt cx="0" cy="0"/>
         </a:xfrm>
       </p:grpSpPr>
-      <p:sp>
-        <p:nvSpPr>
-          <p:cNvPr id="159" name="Rectangle 158">
-            <a:extLst>
-              <a:ext uri="{FF2B5EF4-FFF2-40B4-BE49-F238E27FC236}">
-                <a16:creationId xmlns:a16="http://schemas.microsoft.com/office/drawing/2014/main" id="{4091D693-0C0C-1202-7A2E-B9A231B0891F}"/>
-              </a:ext>
-            </a:extLst>
-          </p:cNvPr>
-          <p:cNvSpPr/>
-          <p:nvPr/>
-        </p:nvSpPr>
-        <p:spPr>
-          <a:xfrm>
-            <a:off x="2169085" y="3775960"/>
-            <a:ext cx="4697622" cy="1437810"/>
-          </a:xfrm>
-          <a:prstGeom prst="rect">
-            <a:avLst/>
-          </a:prstGeom>
-          <a:solidFill>
-            <a:schemeClr val="accent2">
-              <a:lumMod val="20000"/>
-              <a:lumOff val="80000"/>
-            </a:schemeClr>
-          </a:solidFill>
-        </p:spPr>
-        <p:style>
-          <a:lnRef idx="2">
-            <a:schemeClr val="accent1">
-              <a:shade val="15000"/>
-            </a:schemeClr>
-          </a:lnRef>
-          <a:fillRef idx="1">
-            <a:schemeClr val="accent1"/>
-          </a:fillRef>
-          <a:effectRef idx="0">
-            <a:schemeClr val="accent1"/>
-          </a:effectRef>
-          <a:fontRef idx="minor">
-            <a:schemeClr val="lt1"/>
-          </a:fontRef>
-        </p:style>
-        <p:txBody>
-          <a:bodyPr rtlCol="0" anchor="ctr"/>
-          <a:lstStyle/>
-          <a:p>
-            <a:pPr algn="ctr"/>
-            <a:endParaRPr lang="en-GB"/>
-          </a:p>
-        </p:txBody>
-      </p:sp>
       <p:grpSp>
         <p:nvGrpSpPr>
           <p:cNvPr id="108" name="Group 107">
@@ -3708,8 +3656,8 @@
         </p:nvGrpSpPr>
         <p:grpSpPr>
           <a:xfrm>
-            <a:off x="7246254" y="2956149"/>
-            <a:ext cx="2472645" cy="1408589"/>
+            <a:off x="6570734" y="3108672"/>
+            <a:ext cx="2472645" cy="1508784"/>
             <a:chOff x="5962485" y="2963862"/>
             <a:chExt cx="2472645" cy="1408589"/>
           </a:xfrm>
@@ -3999,7 +3947,7 @@
         <p:spPr>
           <a:xfrm>
             <a:off x="1626561" y="759261"/>
-            <a:ext cx="6985812" cy="1991659"/>
+            <a:ext cx="7416818" cy="1991659"/>
           </a:xfrm>
           <a:prstGeom prst="rect">
             <a:avLst/>
@@ -4335,9 +4283,9 @@
           <p:nvPr/>
         </p:nvCxnSpPr>
         <p:spPr>
-          <a:xfrm flipV="1">
-            <a:off x="6638035" y="2134459"/>
-            <a:ext cx="813918" cy="2521"/>
+          <a:xfrm>
+            <a:off x="6638035" y="2136980"/>
+            <a:ext cx="1081551" cy="6384"/>
           </a:xfrm>
           <a:prstGeom prst="straightConnector1">
             <a:avLst/>
@@ -4378,7 +4326,7 @@
         </p:nvSpPr>
         <p:spPr>
           <a:xfrm>
-            <a:off x="6777404" y="1668785"/>
+            <a:off x="6964411" y="1691222"/>
             <a:ext cx="546884" cy="371209"/>
           </a:xfrm>
           <a:prstGeom prst="rect">
@@ -4418,7 +4366,7 @@
         </p:nvSpPr>
         <p:spPr>
           <a:xfrm>
-            <a:off x="7451953" y="1846489"/>
+            <a:off x="7719586" y="1855394"/>
             <a:ext cx="857836" cy="575939"/>
           </a:xfrm>
           <a:prstGeom prst="rect">
@@ -4651,7 +4599,7 @@
         </p:nvSpPr>
         <p:spPr>
           <a:xfrm>
-            <a:off x="7719586" y="1371542"/>
+            <a:off x="7881355" y="1372303"/>
             <a:ext cx="337931" cy="369332"/>
           </a:xfrm>
           <a:prstGeom prst="rect">
@@ -4690,8 +4638,8 @@
         </p:nvCxnSpPr>
         <p:spPr>
           <a:xfrm flipV="1">
-            <a:off x="7880871" y="1547813"/>
-            <a:ext cx="367779" cy="298676"/>
+            <a:off x="8148504" y="1496575"/>
+            <a:ext cx="298939" cy="358819"/>
           </a:xfrm>
           <a:prstGeom prst="straightConnector1">
             <a:avLst/>
@@ -4852,8 +4800,8 @@
         </p:nvCxnSpPr>
         <p:spPr>
           <a:xfrm rot="16200000" flipH="1">
-            <a:off x="6605726" y="2047515"/>
-            <a:ext cx="1054988" cy="1848206"/>
+            <a:off x="6172394" y="2480847"/>
+            <a:ext cx="1246132" cy="1172686"/>
           </a:xfrm>
           <a:prstGeom prst="bentConnector2">
             <a:avLst/>
@@ -5034,88 +4982,460 @@
           </a:p>
         </p:txBody>
       </p:sp>
-      <p:sp>
-        <p:nvSpPr>
-          <p:cNvPr id="110" name="正方形/長方形 4">
-            <a:extLst>
-              <a:ext uri="{FF2B5EF4-FFF2-40B4-BE49-F238E27FC236}">
-                <a16:creationId xmlns:a16="http://schemas.microsoft.com/office/drawing/2014/main" id="{36A9719B-E32E-802C-E9AD-306F27945779}"/>
-              </a:ext>
-            </a:extLst>
-          </p:cNvPr>
-          <p:cNvSpPr/>
-          <p:nvPr/>
-        </p:nvSpPr>
-        <p:spPr>
-          <a:xfrm>
-            <a:off x="2399789" y="4057592"/>
-            <a:ext cx="785740" cy="614289"/>
-          </a:xfrm>
-          <a:prstGeom prst="rect">
-            <a:avLst/>
-          </a:prstGeom>
-          <a:ln>
+      <p:grpSp>
+        <p:nvGrpSpPr>
+          <p:cNvPr id="21" name="Group 20">
+            <a:extLst>
+              <a:ext uri="{FF2B5EF4-FFF2-40B4-BE49-F238E27FC236}">
+                <a16:creationId xmlns:a16="http://schemas.microsoft.com/office/drawing/2014/main" id="{AB5F9CA8-292E-53BE-B068-2074117C5A01}"/>
+              </a:ext>
+            </a:extLst>
+          </p:cNvPr>
+          <p:cNvGrpSpPr/>
+          <p:nvPr/>
+        </p:nvGrpSpPr>
+        <p:grpSpPr>
+          <a:xfrm>
+            <a:off x="2143971" y="3111534"/>
+            <a:ext cx="3466171" cy="1508784"/>
+            <a:chOff x="2143971" y="3171416"/>
+            <a:chExt cx="3466171" cy="1508784"/>
+          </a:xfrm>
+        </p:grpSpPr>
+        <p:sp>
+          <p:nvSpPr>
+            <p:cNvPr id="159" name="Rectangle 158">
+              <a:extLst>
+                <a:ext uri="{FF2B5EF4-FFF2-40B4-BE49-F238E27FC236}">
+                  <a16:creationId xmlns:a16="http://schemas.microsoft.com/office/drawing/2014/main" id="{4091D693-0C0C-1202-7A2E-B9A231B0891F}"/>
+                </a:ext>
+              </a:extLst>
+            </p:cNvPr>
+            <p:cNvSpPr/>
+            <p:nvPr/>
+          </p:nvSpPr>
+          <p:spPr>
+            <a:xfrm>
+              <a:off x="2143971" y="3171416"/>
+              <a:ext cx="3466171" cy="1508784"/>
+            </a:xfrm>
+            <a:prstGeom prst="rect">
+              <a:avLst/>
+            </a:prstGeom>
             <a:solidFill>
+              <a:schemeClr val="accent2">
+                <a:lumMod val="20000"/>
+                <a:lumOff val="80000"/>
+              </a:schemeClr>
+            </a:solidFill>
+          </p:spPr>
+          <p:style>
+            <a:lnRef idx="2">
+              <a:schemeClr val="accent1">
+                <a:shade val="15000"/>
+              </a:schemeClr>
+            </a:lnRef>
+            <a:fillRef idx="1">
+              <a:schemeClr val="accent1"/>
+            </a:fillRef>
+            <a:effectRef idx="0">
+              <a:schemeClr val="accent1"/>
+            </a:effectRef>
+            <a:fontRef idx="minor">
+              <a:schemeClr val="lt1"/>
+            </a:fontRef>
+          </p:style>
+          <p:txBody>
+            <a:bodyPr rtlCol="0" anchor="ctr"/>
+            <a:lstStyle/>
+            <a:p>
+              <a:pPr algn="ctr"/>
+              <a:endParaRPr lang="en-GB"/>
+            </a:p>
+          </p:txBody>
+        </p:sp>
+        <p:sp>
+          <p:nvSpPr>
+            <p:cNvPr id="110" name="正方形/長方形 4">
+              <a:extLst>
+                <a:ext uri="{FF2B5EF4-FFF2-40B4-BE49-F238E27FC236}">
+                  <a16:creationId xmlns:a16="http://schemas.microsoft.com/office/drawing/2014/main" id="{36A9719B-E32E-802C-E9AD-306F27945779}"/>
+                </a:ext>
+              </a:extLst>
+            </p:cNvPr>
+            <p:cNvSpPr/>
+            <p:nvPr/>
+          </p:nvSpPr>
+          <p:spPr>
+            <a:xfrm>
+              <a:off x="2392580" y="3464775"/>
+              <a:ext cx="785740" cy="644612"/>
+            </a:xfrm>
+            <a:prstGeom prst="rect">
+              <a:avLst/>
+            </a:prstGeom>
+            <a:ln>
+              <a:solidFill>
+                <a:schemeClr val="tx1"/>
+              </a:solidFill>
+            </a:ln>
+          </p:spPr>
+          <p:style>
+            <a:lnRef idx="2">
+              <a:schemeClr val="accent6"/>
+            </a:lnRef>
+            <a:fillRef idx="1">
+              <a:schemeClr val="lt1"/>
+            </a:fillRef>
+            <a:effectRef idx="0">
+              <a:schemeClr val="accent6"/>
+            </a:effectRef>
+            <a:fontRef idx="minor">
+              <a:schemeClr val="dk1"/>
+            </a:fontRef>
+          </p:style>
+          <p:txBody>
+            <a:bodyPr rtlCol="0" anchor="ctr"/>
+            <a:lstStyle/>
+            <a:p>
+              <a:pPr algn="ctr"/>
+              <a:r>
+                <a:rPr lang="en-GB" dirty="0">
+                  <a:latin typeface="Times New Roman" panose="02020603050405020304" pitchFamily="18" charset="0"/>
+                  <a:cs typeface="Times New Roman" panose="02020603050405020304" pitchFamily="18" charset="0"/>
+                </a:rPr>
+                <a:t>A</a:t>
+              </a:r>
+              <a:r>
+                <a:rPr lang="en-GB" baseline="-25000" dirty="0">
+                  <a:latin typeface="Times New Roman" panose="02020603050405020304" pitchFamily="18" charset="0"/>
+                  <a:cs typeface="Times New Roman" panose="02020603050405020304" pitchFamily="18" charset="0"/>
+                </a:rPr>
+                <a:t>1,i</a:t>
+              </a:r>
+            </a:p>
+          </p:txBody>
+        </p:sp>
+        <p:cxnSp>
+          <p:nvCxnSpPr>
+            <p:cNvPr id="111" name="直線矢印コネクタ 8">
+              <a:extLst>
+                <a:ext uri="{FF2B5EF4-FFF2-40B4-BE49-F238E27FC236}">
+                  <a16:creationId xmlns:a16="http://schemas.microsoft.com/office/drawing/2014/main" id="{C0A9B16F-E1BA-9697-80E6-DF2C82075F2A}"/>
+                </a:ext>
+              </a:extLst>
+            </p:cNvPr>
+            <p:cNvCxnSpPr>
+              <a:cxnSpLocks/>
+              <a:stCxn id="110" idx="3"/>
+              <a:endCxn id="119" idx="1"/>
+            </p:cNvCxnSpPr>
+            <p:nvPr/>
+          </p:nvCxnSpPr>
+          <p:spPr>
+            <a:xfrm>
+              <a:off x="3178320" y="3787081"/>
+              <a:ext cx="519195" cy="6661"/>
+            </a:xfrm>
+            <a:prstGeom prst="straightConnector1">
+              <a:avLst/>
+            </a:prstGeom>
+            <a:ln w="19050">
+              <a:solidFill>
+                <a:schemeClr val="tx1"/>
+              </a:solidFill>
+              <a:tailEnd type="triangle"/>
+            </a:ln>
+          </p:spPr>
+          <p:style>
+            <a:lnRef idx="1">
+              <a:schemeClr val="accent1"/>
+            </a:lnRef>
+            <a:fillRef idx="0">
+              <a:schemeClr val="accent1"/>
+            </a:fillRef>
+            <a:effectRef idx="0">
+              <a:schemeClr val="accent1"/>
+            </a:effectRef>
+            <a:fontRef idx="minor">
               <a:schemeClr val="tx1"/>
-            </a:solidFill>
-          </a:ln>
-        </p:spPr>
-        <p:style>
-          <a:lnRef idx="2">
-            <a:schemeClr val="accent6"/>
-          </a:lnRef>
-          <a:fillRef idx="1">
-            <a:schemeClr val="lt1"/>
-          </a:fillRef>
-          <a:effectRef idx="0">
-            <a:schemeClr val="accent6"/>
-          </a:effectRef>
-          <a:fontRef idx="minor">
-            <a:schemeClr val="dk1"/>
-          </a:fontRef>
-        </p:style>
-        <p:txBody>
-          <a:bodyPr rtlCol="0" anchor="ctr"/>
-          <a:lstStyle/>
-          <a:p>
-            <a:pPr algn="ctr"/>
-            <a:r>
-              <a:rPr lang="en-GB" dirty="0">
-                <a:latin typeface="Times New Roman" panose="02020603050405020304" pitchFamily="18" charset="0"/>
-                <a:cs typeface="Times New Roman" panose="02020603050405020304" pitchFamily="18" charset="0"/>
-              </a:rPr>
-              <a:t>A</a:t>
-            </a:r>
-            <a:r>
-              <a:rPr lang="en-GB" baseline="-25000" dirty="0">
-                <a:latin typeface="Times New Roman" panose="02020603050405020304" pitchFamily="18" charset="0"/>
-                <a:cs typeface="Times New Roman" panose="02020603050405020304" pitchFamily="18" charset="0"/>
-              </a:rPr>
-              <a:t>1,i</a:t>
-            </a:r>
-          </a:p>
-        </p:txBody>
-      </p:sp>
+            </a:fontRef>
+          </p:style>
+        </p:cxnSp>
+        <p:sp>
+          <p:nvSpPr>
+            <p:cNvPr id="119" name="TextBox 118">
+              <a:extLst>
+                <a:ext uri="{FF2B5EF4-FFF2-40B4-BE49-F238E27FC236}">
+                  <a16:creationId xmlns:a16="http://schemas.microsoft.com/office/drawing/2014/main" id="{E5C26570-E39A-7F65-6267-E07FF339F23C}"/>
+                </a:ext>
+              </a:extLst>
+            </p:cNvPr>
+            <p:cNvSpPr txBox="1"/>
+            <p:nvPr/>
+          </p:nvSpPr>
+          <p:spPr>
+            <a:xfrm>
+              <a:off x="3697515" y="3599960"/>
+              <a:ext cx="505018" cy="387563"/>
+            </a:xfrm>
+            <a:prstGeom prst="rect">
+              <a:avLst/>
+            </a:prstGeom>
+            <a:noFill/>
+          </p:spPr>
+          <p:txBody>
+            <a:bodyPr wrap="square" rtlCol="0">
+              <a:spAutoFit/>
+            </a:bodyPr>
+            <a:lstStyle/>
+            <a:p>
+              <a:r>
+                <a:rPr lang="en-GB" dirty="0"/>
+                <a:t> …</a:t>
+              </a:r>
+            </a:p>
+          </p:txBody>
+        </p:sp>
+        <p:cxnSp>
+          <p:nvCxnSpPr>
+            <p:cNvPr id="120" name="直線矢印コネクタ 8">
+              <a:extLst>
+                <a:ext uri="{FF2B5EF4-FFF2-40B4-BE49-F238E27FC236}">
+                  <a16:creationId xmlns:a16="http://schemas.microsoft.com/office/drawing/2014/main" id="{FE53D797-9774-51EF-34FA-1862328BF5C7}"/>
+                </a:ext>
+              </a:extLst>
+            </p:cNvPr>
+            <p:cNvCxnSpPr>
+              <a:cxnSpLocks/>
+              <a:stCxn id="119" idx="3"/>
+              <a:endCxn id="121" idx="1"/>
+            </p:cNvCxnSpPr>
+            <p:nvPr/>
+          </p:nvCxnSpPr>
+          <p:spPr>
+            <a:xfrm flipV="1">
+              <a:off x="4202533" y="3789256"/>
+              <a:ext cx="341406" cy="4486"/>
+            </a:xfrm>
+            <a:prstGeom prst="straightConnector1">
+              <a:avLst/>
+            </a:prstGeom>
+            <a:ln w="19050">
+              <a:solidFill>
+                <a:schemeClr val="tx1"/>
+              </a:solidFill>
+              <a:tailEnd type="triangle"/>
+            </a:ln>
+          </p:spPr>
+          <p:style>
+            <a:lnRef idx="1">
+              <a:schemeClr val="accent1"/>
+            </a:lnRef>
+            <a:fillRef idx="0">
+              <a:schemeClr val="accent1"/>
+            </a:fillRef>
+            <a:effectRef idx="0">
+              <a:schemeClr val="accent1"/>
+            </a:effectRef>
+            <a:fontRef idx="minor">
+              <a:schemeClr val="tx1"/>
+            </a:fontRef>
+          </p:style>
+        </p:cxnSp>
+        <p:sp>
+          <p:nvSpPr>
+            <p:cNvPr id="121" name="正方形/長方形 4">
+              <a:extLst>
+                <a:ext uri="{FF2B5EF4-FFF2-40B4-BE49-F238E27FC236}">
+                  <a16:creationId xmlns:a16="http://schemas.microsoft.com/office/drawing/2014/main" id="{B9236349-D4D7-D96F-95C7-7D3C45F82871}"/>
+                </a:ext>
+              </a:extLst>
+            </p:cNvPr>
+            <p:cNvSpPr/>
+            <p:nvPr/>
+          </p:nvSpPr>
+          <p:spPr>
+            <a:xfrm>
+              <a:off x="4543939" y="3466950"/>
+              <a:ext cx="785740" cy="644612"/>
+            </a:xfrm>
+            <a:prstGeom prst="rect">
+              <a:avLst/>
+            </a:prstGeom>
+            <a:ln>
+              <a:solidFill>
+                <a:schemeClr val="tx1"/>
+              </a:solidFill>
+            </a:ln>
+          </p:spPr>
+          <p:style>
+            <a:lnRef idx="2">
+              <a:schemeClr val="accent6"/>
+            </a:lnRef>
+            <a:fillRef idx="1">
+              <a:schemeClr val="lt1"/>
+            </a:fillRef>
+            <a:effectRef idx="0">
+              <a:schemeClr val="accent6"/>
+            </a:effectRef>
+            <a:fontRef idx="minor">
+              <a:schemeClr val="dk1"/>
+            </a:fontRef>
+          </p:style>
+          <p:txBody>
+            <a:bodyPr rtlCol="0" anchor="ctr"/>
+            <a:lstStyle/>
+            <a:p>
+              <a:pPr algn="ctr"/>
+              <a:r>
+                <a:rPr lang="en-GB" dirty="0">
+                  <a:latin typeface="Times New Roman" panose="02020603050405020304" pitchFamily="18" charset="0"/>
+                  <a:cs typeface="Times New Roman" panose="02020603050405020304" pitchFamily="18" charset="0"/>
+                </a:rPr>
+                <a:t>A</a:t>
+              </a:r>
+              <a:r>
+                <a:rPr lang="en-GB" baseline="-25000" dirty="0">
+                  <a:latin typeface="Times New Roman" panose="02020603050405020304" pitchFamily="18" charset="0"/>
+                  <a:cs typeface="Times New Roman" panose="02020603050405020304" pitchFamily="18" charset="0"/>
+                </a:rPr>
+                <a:t>6,i</a:t>
+              </a:r>
+            </a:p>
+          </p:txBody>
+        </p:sp>
+        <p:sp>
+          <p:nvSpPr>
+            <p:cNvPr id="160" name="TextBox 159">
+              <a:extLst>
+                <a:ext uri="{FF2B5EF4-FFF2-40B4-BE49-F238E27FC236}">
+                  <a16:creationId xmlns:a16="http://schemas.microsoft.com/office/drawing/2014/main" id="{4D3B2F92-5983-84E6-C403-6F93914C3A57}"/>
+                </a:ext>
+              </a:extLst>
+            </p:cNvPr>
+            <p:cNvSpPr txBox="1"/>
+            <p:nvPr/>
+          </p:nvSpPr>
+          <p:spPr>
+            <a:xfrm>
+              <a:off x="2523873" y="4195746"/>
+              <a:ext cx="2852302" cy="387563"/>
+            </a:xfrm>
+            <a:prstGeom prst="rect">
+              <a:avLst/>
+            </a:prstGeom>
+            <a:noFill/>
+          </p:spPr>
+          <p:txBody>
+            <a:bodyPr wrap="square" rtlCol="0">
+              <a:spAutoFit/>
+            </a:bodyPr>
+            <a:lstStyle/>
+            <a:p>
+              <a:r>
+                <a:rPr lang="en-GB" b="1" i="1" dirty="0">
+                  <a:latin typeface="Arial" panose="020B0604020202020204" pitchFamily="34" charset="0"/>
+                  <a:cs typeface="Arial" panose="020B0604020202020204" pitchFamily="34" charset="0"/>
+                </a:rPr>
+                <a:t>AFP surveillance model</a:t>
+              </a:r>
+            </a:p>
+          </p:txBody>
+        </p:sp>
+        <p:sp>
+          <p:nvSpPr>
+            <p:cNvPr id="161" name="テキスト ボックス 20">
+              <a:extLst>
+                <a:ext uri="{FF2B5EF4-FFF2-40B4-BE49-F238E27FC236}">
+                  <a16:creationId xmlns:a16="http://schemas.microsoft.com/office/drawing/2014/main" id="{454F8D11-8174-C656-5138-A83A0A71AE91}"/>
+                </a:ext>
+              </a:extLst>
+            </p:cNvPr>
+            <p:cNvSpPr txBox="1"/>
+            <p:nvPr/>
+          </p:nvSpPr>
+          <p:spPr>
+            <a:xfrm>
+              <a:off x="3266520" y="3344957"/>
+              <a:ext cx="546884" cy="387563"/>
+            </a:xfrm>
+            <a:prstGeom prst="rect">
+              <a:avLst/>
+            </a:prstGeom>
+            <a:noFill/>
+          </p:spPr>
+          <p:txBody>
+            <a:bodyPr wrap="square" rtlCol="0">
+              <a:spAutoFit/>
+            </a:bodyPr>
+            <a:lstStyle/>
+            <a:p>
+              <a:r>
+                <a:rPr lang="el-GR" dirty="0"/>
+                <a:t>σ</a:t>
+              </a:r>
+              <a:endParaRPr lang="en-GB" dirty="0"/>
+            </a:p>
+          </p:txBody>
+        </p:sp>
+        <p:sp>
+          <p:nvSpPr>
+            <p:cNvPr id="162" name="テキスト ボックス 20">
+              <a:extLst>
+                <a:ext uri="{FF2B5EF4-FFF2-40B4-BE49-F238E27FC236}">
+                  <a16:creationId xmlns:a16="http://schemas.microsoft.com/office/drawing/2014/main" id="{1325A213-800C-C090-84A3-16E7CEED4605}"/>
+                </a:ext>
+              </a:extLst>
+            </p:cNvPr>
+            <p:cNvSpPr txBox="1"/>
+            <p:nvPr/>
+          </p:nvSpPr>
+          <p:spPr>
+            <a:xfrm>
+              <a:off x="4202533" y="3344957"/>
+              <a:ext cx="546884" cy="387563"/>
+            </a:xfrm>
+            <a:prstGeom prst="rect">
+              <a:avLst/>
+            </a:prstGeom>
+            <a:noFill/>
+          </p:spPr>
+          <p:txBody>
+            <a:bodyPr wrap="square" rtlCol="0">
+              <a:spAutoFit/>
+            </a:bodyPr>
+            <a:lstStyle/>
+            <a:p>
+              <a:r>
+                <a:rPr lang="el-GR" dirty="0"/>
+                <a:t>σ</a:t>
+              </a:r>
+              <a:endParaRPr lang="en-GB" dirty="0"/>
+            </a:p>
+          </p:txBody>
+        </p:sp>
+      </p:grpSp>
       <p:cxnSp>
         <p:nvCxnSpPr>
-          <p:cNvPr id="111" name="直線矢印コネクタ 8">
-            <a:extLst>
-              <a:ext uri="{FF2B5EF4-FFF2-40B4-BE49-F238E27FC236}">
-                <a16:creationId xmlns:a16="http://schemas.microsoft.com/office/drawing/2014/main" id="{C0A9B16F-E1BA-9697-80E6-DF2C82075F2A}"/>
+          <p:cNvPr id="146" name="直線矢印コネクタ 8">
+            <a:extLst>
+              <a:ext uri="{FF2B5EF4-FFF2-40B4-BE49-F238E27FC236}">
+                <a16:creationId xmlns:a16="http://schemas.microsoft.com/office/drawing/2014/main" id="{99AC7A23-D8A7-3B31-6C54-D594B8FCA49F}"/>
               </a:ext>
             </a:extLst>
           </p:cNvPr>
           <p:cNvCxnSpPr>
             <a:cxnSpLocks/>
-            <a:stCxn id="110" idx="3"/>
-            <a:endCxn id="119" idx="1"/>
+            <a:stCxn id="6" idx="2"/>
+            <a:endCxn id="110" idx="0"/>
           </p:cNvCxnSpPr>
           <p:nvPr/>
         </p:nvCxnSpPr>
         <p:spPr>
-          <a:xfrm>
-            <a:off x="3185529" y="4364737"/>
-            <a:ext cx="537100" cy="4274"/>
+          <a:xfrm flipH="1">
+            <a:off x="2785450" y="2441603"/>
+            <a:ext cx="8307" cy="963290"/>
           </a:xfrm>
           <a:prstGeom prst="straightConnector1">
             <a:avLst/>
@@ -5144,10 +5464,10 @@
       </p:cxnSp>
       <p:sp>
         <p:nvSpPr>
-          <p:cNvPr id="119" name="TextBox 118">
-            <a:extLst>
-              <a:ext uri="{FF2B5EF4-FFF2-40B4-BE49-F238E27FC236}">
-                <a16:creationId xmlns:a16="http://schemas.microsoft.com/office/drawing/2014/main" id="{E5C26570-E39A-7F65-6267-E07FF339F23C}"/>
+          <p:cNvPr id="150" name="テキスト ボックス 20">
+            <a:extLst>
+              <a:ext uri="{FF2B5EF4-FFF2-40B4-BE49-F238E27FC236}">
+                <a16:creationId xmlns:a16="http://schemas.microsoft.com/office/drawing/2014/main" id="{34659143-C91C-EE76-2C8E-D5B19EF22EB2}"/>
               </a:ext>
             </a:extLst>
           </p:cNvPr>
@@ -5156,8 +5476,8 @@
         </p:nvSpPr>
         <p:spPr>
           <a:xfrm>
-            <a:off x="3722629" y="4184345"/>
-            <a:ext cx="505018" cy="369332"/>
+            <a:off x="2762737" y="2731632"/>
+            <a:ext cx="840702" cy="369332"/>
           </a:xfrm>
           <a:prstGeom prst="rect">
             <a:avLst/>
@@ -5171,303 +5491,6 @@
           <a:lstStyle/>
           <a:p>
             <a:r>
-              <a:rPr lang="en-GB" dirty="0"/>
-              <a:t> …</a:t>
-            </a:r>
-          </a:p>
-        </p:txBody>
-      </p:sp>
-      <p:cxnSp>
-        <p:nvCxnSpPr>
-          <p:cNvPr id="120" name="直線矢印コネクタ 8">
-            <a:extLst>
-              <a:ext uri="{FF2B5EF4-FFF2-40B4-BE49-F238E27FC236}">
-                <a16:creationId xmlns:a16="http://schemas.microsoft.com/office/drawing/2014/main" id="{FE53D797-9774-51EF-34FA-1862328BF5C7}"/>
-              </a:ext>
-            </a:extLst>
-          </p:cNvPr>
-          <p:cNvCxnSpPr>
-            <a:cxnSpLocks/>
-            <a:stCxn id="119" idx="3"/>
-            <a:endCxn id="121" idx="1"/>
-          </p:cNvCxnSpPr>
-          <p:nvPr/>
-        </p:nvCxnSpPr>
-        <p:spPr>
-          <a:xfrm flipV="1">
-            <a:off x="4227647" y="4364737"/>
-            <a:ext cx="341406" cy="4274"/>
-          </a:xfrm>
-          <a:prstGeom prst="straightConnector1">
-            <a:avLst/>
-          </a:prstGeom>
-          <a:ln w="19050">
-            <a:solidFill>
-              <a:schemeClr val="tx1"/>
-            </a:solidFill>
-            <a:tailEnd type="triangle"/>
-          </a:ln>
-        </p:spPr>
-        <p:style>
-          <a:lnRef idx="1">
-            <a:schemeClr val="accent1"/>
-          </a:lnRef>
-          <a:fillRef idx="0">
-            <a:schemeClr val="accent1"/>
-          </a:fillRef>
-          <a:effectRef idx="0">
-            <a:schemeClr val="accent1"/>
-          </a:effectRef>
-          <a:fontRef idx="minor">
-            <a:schemeClr val="tx1"/>
-          </a:fontRef>
-        </p:style>
-      </p:cxnSp>
-      <p:sp>
-        <p:nvSpPr>
-          <p:cNvPr id="121" name="正方形/長方形 4">
-            <a:extLst>
-              <a:ext uri="{FF2B5EF4-FFF2-40B4-BE49-F238E27FC236}">
-                <a16:creationId xmlns:a16="http://schemas.microsoft.com/office/drawing/2014/main" id="{B9236349-D4D7-D96F-95C7-7D3C45F82871}"/>
-              </a:ext>
-            </a:extLst>
-          </p:cNvPr>
-          <p:cNvSpPr/>
-          <p:nvPr/>
-        </p:nvSpPr>
-        <p:spPr>
-          <a:xfrm>
-            <a:off x="4569053" y="4057592"/>
-            <a:ext cx="785740" cy="614289"/>
-          </a:xfrm>
-          <a:prstGeom prst="rect">
-            <a:avLst/>
-          </a:prstGeom>
-          <a:ln>
-            <a:solidFill>
-              <a:schemeClr val="tx1"/>
-            </a:solidFill>
-          </a:ln>
-        </p:spPr>
-        <p:style>
-          <a:lnRef idx="2">
-            <a:schemeClr val="accent6"/>
-          </a:lnRef>
-          <a:fillRef idx="1">
-            <a:schemeClr val="lt1"/>
-          </a:fillRef>
-          <a:effectRef idx="0">
-            <a:schemeClr val="accent6"/>
-          </a:effectRef>
-          <a:fontRef idx="minor">
-            <a:schemeClr val="dk1"/>
-          </a:fontRef>
-        </p:style>
-        <p:txBody>
-          <a:bodyPr rtlCol="0" anchor="ctr"/>
-          <a:lstStyle/>
-          <a:p>
-            <a:pPr algn="ctr"/>
-            <a:r>
-              <a:rPr lang="en-GB" dirty="0">
-                <a:latin typeface="Times New Roman" panose="02020603050405020304" pitchFamily="18" charset="0"/>
-                <a:cs typeface="Times New Roman" panose="02020603050405020304" pitchFamily="18" charset="0"/>
-              </a:rPr>
-              <a:t>A</a:t>
-            </a:r>
-            <a:r>
-              <a:rPr lang="en-GB" baseline="-25000" dirty="0">
-                <a:latin typeface="Times New Roman" panose="02020603050405020304" pitchFamily="18" charset="0"/>
-                <a:cs typeface="Times New Roman" panose="02020603050405020304" pitchFamily="18" charset="0"/>
-              </a:rPr>
-              <a:t>6,i</a:t>
-            </a:r>
-          </a:p>
-        </p:txBody>
-      </p:sp>
-      <p:sp>
-        <p:nvSpPr>
-          <p:cNvPr id="128" name="正方形/長方形 4">
-            <a:extLst>
-              <a:ext uri="{FF2B5EF4-FFF2-40B4-BE49-F238E27FC236}">
-                <a16:creationId xmlns:a16="http://schemas.microsoft.com/office/drawing/2014/main" id="{21E6C3D7-F4D9-19B4-5B9F-0190C4EA07E9}"/>
-              </a:ext>
-            </a:extLst>
-          </p:cNvPr>
-          <p:cNvSpPr/>
-          <p:nvPr/>
-        </p:nvSpPr>
-        <p:spPr>
-          <a:xfrm>
-            <a:off x="5852295" y="4057593"/>
-            <a:ext cx="785740" cy="614289"/>
-          </a:xfrm>
-          <a:prstGeom prst="rect">
-            <a:avLst/>
-          </a:prstGeom>
-          <a:ln>
-            <a:solidFill>
-              <a:schemeClr val="tx1"/>
-            </a:solidFill>
-          </a:ln>
-        </p:spPr>
-        <p:style>
-          <a:lnRef idx="2">
-            <a:schemeClr val="accent6"/>
-          </a:lnRef>
-          <a:fillRef idx="1">
-            <a:schemeClr val="lt1"/>
-          </a:fillRef>
-          <a:effectRef idx="0">
-            <a:schemeClr val="accent6"/>
-          </a:effectRef>
-          <a:fontRef idx="minor">
-            <a:schemeClr val="dk1"/>
-          </a:fontRef>
-        </p:style>
-        <p:txBody>
-          <a:bodyPr rtlCol="0" anchor="ctr"/>
-          <a:lstStyle/>
-          <a:p>
-            <a:pPr algn="ctr"/>
-            <a:r>
-              <a:rPr lang="en-GB" dirty="0">
-                <a:latin typeface="Times New Roman" panose="02020603050405020304" pitchFamily="18" charset="0"/>
-                <a:cs typeface="Times New Roman" panose="02020603050405020304" pitchFamily="18" charset="0"/>
-              </a:rPr>
-              <a:t>H</a:t>
-            </a:r>
-            <a:r>
-              <a:rPr lang="en-GB" baseline="-25000" dirty="0">
-                <a:latin typeface="Times New Roman" panose="02020603050405020304" pitchFamily="18" charset="0"/>
-                <a:cs typeface="Times New Roman" panose="02020603050405020304" pitchFamily="18" charset="0"/>
-              </a:rPr>
-              <a:t>i</a:t>
-            </a:r>
-          </a:p>
-        </p:txBody>
-      </p:sp>
-      <p:cxnSp>
-        <p:nvCxnSpPr>
-          <p:cNvPr id="129" name="直線矢印コネクタ 8">
-            <a:extLst>
-              <a:ext uri="{FF2B5EF4-FFF2-40B4-BE49-F238E27FC236}">
-                <a16:creationId xmlns:a16="http://schemas.microsoft.com/office/drawing/2014/main" id="{BF565F9C-A5E9-8A47-78AD-DB4412ADC47F}"/>
-              </a:ext>
-            </a:extLst>
-          </p:cNvPr>
-          <p:cNvCxnSpPr>
-            <a:cxnSpLocks/>
-            <a:stCxn id="121" idx="3"/>
-            <a:endCxn id="128" idx="1"/>
-          </p:cNvCxnSpPr>
-          <p:nvPr/>
-        </p:nvCxnSpPr>
-        <p:spPr>
-          <a:xfrm>
-            <a:off x="5354793" y="4364737"/>
-            <a:ext cx="497502" cy="1"/>
-          </a:xfrm>
-          <a:prstGeom prst="straightConnector1">
-            <a:avLst/>
-          </a:prstGeom>
-          <a:ln w="19050">
-            <a:solidFill>
-              <a:schemeClr val="tx1"/>
-            </a:solidFill>
-            <a:tailEnd type="triangle"/>
-          </a:ln>
-        </p:spPr>
-        <p:style>
-          <a:lnRef idx="1">
-            <a:schemeClr val="accent1"/>
-          </a:lnRef>
-          <a:fillRef idx="0">
-            <a:schemeClr val="accent1"/>
-          </a:fillRef>
-          <a:effectRef idx="0">
-            <a:schemeClr val="accent1"/>
-          </a:effectRef>
-          <a:fontRef idx="minor">
-            <a:schemeClr val="tx1"/>
-          </a:fontRef>
-        </p:style>
-      </p:cxnSp>
-      <p:cxnSp>
-        <p:nvCxnSpPr>
-          <p:cNvPr id="146" name="直線矢印コネクタ 8">
-            <a:extLst>
-              <a:ext uri="{FF2B5EF4-FFF2-40B4-BE49-F238E27FC236}">
-                <a16:creationId xmlns:a16="http://schemas.microsoft.com/office/drawing/2014/main" id="{99AC7A23-D8A7-3B31-6C54-D594B8FCA49F}"/>
-              </a:ext>
-            </a:extLst>
-          </p:cNvPr>
-          <p:cNvCxnSpPr>
-            <a:cxnSpLocks/>
-            <a:stCxn id="6" idx="2"/>
-            <a:endCxn id="110" idx="0"/>
-          </p:cNvCxnSpPr>
-          <p:nvPr/>
-        </p:nvCxnSpPr>
-        <p:spPr>
-          <a:xfrm flipH="1">
-            <a:off x="2792659" y="2441603"/>
-            <a:ext cx="1098" cy="1615989"/>
-          </a:xfrm>
-          <a:prstGeom prst="straightConnector1">
-            <a:avLst/>
-          </a:prstGeom>
-          <a:ln w="19050">
-            <a:solidFill>
-              <a:schemeClr val="tx1"/>
-            </a:solidFill>
-            <a:tailEnd type="triangle"/>
-          </a:ln>
-        </p:spPr>
-        <p:style>
-          <a:lnRef idx="1">
-            <a:schemeClr val="accent1"/>
-          </a:lnRef>
-          <a:fillRef idx="0">
-            <a:schemeClr val="accent1"/>
-          </a:fillRef>
-          <a:effectRef idx="0">
-            <a:schemeClr val="accent1"/>
-          </a:effectRef>
-          <a:fontRef idx="minor">
-            <a:schemeClr val="tx1"/>
-          </a:fontRef>
-        </p:style>
-      </p:cxnSp>
-      <p:sp>
-        <p:nvSpPr>
-          <p:cNvPr id="150" name="テキスト ボックス 20">
-            <a:extLst>
-              <a:ext uri="{FF2B5EF4-FFF2-40B4-BE49-F238E27FC236}">
-                <a16:creationId xmlns:a16="http://schemas.microsoft.com/office/drawing/2014/main" id="{34659143-C91C-EE76-2C8E-D5B19EF22EB2}"/>
-              </a:ext>
-            </a:extLst>
-          </p:cNvPr>
-          <p:cNvSpPr txBox="1"/>
-          <p:nvPr/>
-        </p:nvSpPr>
-        <p:spPr>
-          <a:xfrm>
-            <a:off x="2840703" y="3016645"/>
-            <a:ext cx="840702" cy="369332"/>
-          </a:xfrm>
-          <a:prstGeom prst="rect">
-            <a:avLst/>
-          </a:prstGeom>
-          <a:noFill/>
-        </p:spPr>
-        <p:txBody>
-          <a:bodyPr wrap="square" rtlCol="0">
-            <a:spAutoFit/>
-          </a:bodyPr>
-          <a:lstStyle/>
-          <a:p>
-            <a:r>
               <a:rPr lang="en-GB" altLang="ja-JP" i="1" dirty="0" err="1"/>
               <a:t>p</a:t>
             </a:r>
@@ -5484,116 +5507,6 @@
               <a:t>i</a:t>
             </a:r>
             <a:endParaRPr lang="en-GB" baseline="-25000" dirty="0"/>
-          </a:p>
-        </p:txBody>
-      </p:sp>
-      <p:sp>
-        <p:nvSpPr>
-          <p:cNvPr id="160" name="TextBox 159">
-            <a:extLst>
-              <a:ext uri="{FF2B5EF4-FFF2-40B4-BE49-F238E27FC236}">
-                <a16:creationId xmlns:a16="http://schemas.microsoft.com/office/drawing/2014/main" id="{4D3B2F92-5983-84E6-C403-6F93914C3A57}"/>
-              </a:ext>
-            </a:extLst>
-          </p:cNvPr>
-          <p:cNvSpPr txBox="1"/>
-          <p:nvPr/>
-        </p:nvSpPr>
-        <p:spPr>
-          <a:xfrm>
-            <a:off x="3169319" y="4760427"/>
-            <a:ext cx="2852302" cy="369332"/>
-          </a:xfrm>
-          <a:prstGeom prst="rect">
-            <a:avLst/>
-          </a:prstGeom>
-          <a:noFill/>
-        </p:spPr>
-        <p:txBody>
-          <a:bodyPr wrap="square" rtlCol="0">
-            <a:spAutoFit/>
-          </a:bodyPr>
-          <a:lstStyle/>
-          <a:p>
-            <a:r>
-              <a:rPr lang="en-GB" b="1" i="1" dirty="0">
-                <a:latin typeface="Arial" panose="020B0604020202020204" pitchFamily="34" charset="0"/>
-                <a:cs typeface="Arial" panose="020B0604020202020204" pitchFamily="34" charset="0"/>
-              </a:rPr>
-              <a:t>AFP surveillance model</a:t>
-            </a:r>
-          </a:p>
-        </p:txBody>
-      </p:sp>
-      <p:sp>
-        <p:nvSpPr>
-          <p:cNvPr id="161" name="テキスト ボックス 20">
-            <a:extLst>
-              <a:ext uri="{FF2B5EF4-FFF2-40B4-BE49-F238E27FC236}">
-                <a16:creationId xmlns:a16="http://schemas.microsoft.com/office/drawing/2014/main" id="{454F8D11-8174-C656-5138-A83A0A71AE91}"/>
-              </a:ext>
-            </a:extLst>
-          </p:cNvPr>
-          <p:cNvSpPr txBox="1"/>
-          <p:nvPr/>
-        </p:nvSpPr>
-        <p:spPr>
-          <a:xfrm>
-            <a:off x="3291634" y="3941338"/>
-            <a:ext cx="546884" cy="369332"/>
-          </a:xfrm>
-          <a:prstGeom prst="rect">
-            <a:avLst/>
-          </a:prstGeom>
-          <a:noFill/>
-        </p:spPr>
-        <p:txBody>
-          <a:bodyPr wrap="square" rtlCol="0">
-            <a:spAutoFit/>
-          </a:bodyPr>
-          <a:lstStyle/>
-          <a:p>
-            <a:r>
-              <a:rPr lang="el-GR" dirty="0"/>
-              <a:t>σ</a:t>
-            </a:r>
-            <a:endParaRPr lang="en-GB" dirty="0"/>
-          </a:p>
-        </p:txBody>
-      </p:sp>
-      <p:sp>
-        <p:nvSpPr>
-          <p:cNvPr id="162" name="テキスト ボックス 20">
-            <a:extLst>
-              <a:ext uri="{FF2B5EF4-FFF2-40B4-BE49-F238E27FC236}">
-                <a16:creationId xmlns:a16="http://schemas.microsoft.com/office/drawing/2014/main" id="{1325A213-800C-C090-84A3-16E7CEED4605}"/>
-              </a:ext>
-            </a:extLst>
-          </p:cNvPr>
-          <p:cNvSpPr txBox="1"/>
-          <p:nvPr/>
-        </p:nvSpPr>
-        <p:spPr>
-          <a:xfrm>
-            <a:off x="5474737" y="3915747"/>
-            <a:ext cx="546884" cy="369332"/>
-          </a:xfrm>
-          <a:prstGeom prst="rect">
-            <a:avLst/>
-          </a:prstGeom>
-          <a:noFill/>
-        </p:spPr>
-        <p:txBody>
-          <a:bodyPr wrap="square" rtlCol="0">
-            <a:spAutoFit/>
-          </a:bodyPr>
-          <a:lstStyle/>
-          <a:p>
-            <a:r>
-              <a:rPr lang="el-GR" dirty="0"/>
-              <a:t>σ</a:t>
-            </a:r>
-            <a:endParaRPr lang="en-GB" dirty="0"/>
           </a:p>
         </p:txBody>
       </p:sp>

</xml_diff>